<commit_message>
small changes to CUNY poster
</commit_message>
<xml_diff>
--- a/presentations/2017 CUNY/RSAPoster.pptx
+++ b/presentations/2017 CUNY/RSAPoster.pptx
@@ -1014,6 +1014,13 @@
         </dgm:presLayoutVars>
       </dgm:prSet>
       <dgm:spPr/>
+      <dgm:t>
+        <a:bodyPr/>
+        <a:lstStyle/>
+        <a:p>
+          <a:endParaRPr lang="en-US"/>
+        </a:p>
+      </dgm:t>
     </dgm:pt>
     <dgm:pt modelId="{E4CCFA41-F774-A94E-A04B-50D8C7DE50ED}" type="pres">
       <dgm:prSet presAssocID="{1789D647-2489-4848-9A26-235FB3D1F445}" presName="Accent1" presStyleCnt="0"/>
@@ -1043,6 +1050,13 @@
         </dgm:presLayoutVars>
       </dgm:prSet>
       <dgm:spPr/>
+      <dgm:t>
+        <a:bodyPr/>
+        <a:lstStyle/>
+        <a:p>
+          <a:endParaRPr lang="en-US"/>
+        </a:p>
+      </dgm:t>
     </dgm:pt>
     <dgm:pt modelId="{0B5AB86D-1A4C-2540-A7C7-76622F06963F}" type="pres">
       <dgm:prSet presAssocID="{F8AEA3BC-9BCC-4946-B4B7-6FC44289BCCC}" presName="Accent2" presStyleCnt="0"/>
@@ -1065,6 +1079,13 @@
         </dgm:presLayoutVars>
       </dgm:prSet>
       <dgm:spPr/>
+      <dgm:t>
+        <a:bodyPr/>
+        <a:lstStyle/>
+        <a:p>
+          <a:endParaRPr lang="en-US"/>
+        </a:p>
+      </dgm:t>
     </dgm:pt>
     <dgm:pt modelId="{59311CE0-53E6-D244-963F-31A850CD4922}" type="pres">
       <dgm:prSet presAssocID="{B7669CF0-A41E-1444-851C-485CA7C02540}" presName="Accent3" presStyleCnt="0"/>
@@ -1087,16 +1108,23 @@
         </dgm:presLayoutVars>
       </dgm:prSet>
       <dgm:spPr/>
+      <dgm:t>
+        <a:bodyPr/>
+        <a:lstStyle/>
+        <a:p>
+          <a:endParaRPr lang="en-US"/>
+        </a:p>
+      </dgm:t>
     </dgm:pt>
   </dgm:ptLst>
   <dgm:cxnLst>
-    <dgm:cxn modelId="{92A58827-15F8-7E4B-AE37-21C40438A6ED}" srcId="{EC01D706-F017-FD44-88D8-6905872D61FE}" destId="{1789D647-2489-4848-9A26-235FB3D1F445}" srcOrd="0" destOrd="0" parTransId="{34DCF5B2-51D9-014D-AA80-13430F13CC75}" sibTransId="{72C663D2-9591-BA4D-A349-8D8BC9DDC2FC}"/>
+    <dgm:cxn modelId="{51370CED-5017-0642-B044-D87BC8F37D3F}" type="presOf" srcId="{F8AEA3BC-9BCC-4946-B4B7-6FC44289BCCC}" destId="{D6B48E76-4AAC-CD48-8B71-6E8F654914BB}" srcOrd="0" destOrd="0" presId="urn:microsoft.com/office/officeart/2009/layout/CircleArrowProcess"/>
+    <dgm:cxn modelId="{73215FFA-C57A-C543-AA35-4CE9EEE844E7}" type="presOf" srcId="{1789D647-2489-4848-9A26-235FB3D1F445}" destId="{70886D2B-160E-C44F-B061-82C93659D59B}" srcOrd="0" destOrd="0" presId="urn:microsoft.com/office/officeart/2009/layout/CircleArrowProcess"/>
     <dgm:cxn modelId="{D4B96F52-BD79-F446-AA12-8F796CD6BA96}" srcId="{EC01D706-F017-FD44-88D8-6905872D61FE}" destId="{F8AEA3BC-9BCC-4946-B4B7-6FC44289BCCC}" srcOrd="1" destOrd="0" parTransId="{03D13353-7593-D643-AF0E-CE20F814132B}" sibTransId="{DD10A488-A756-BA4C-B2EB-3B00C4B12F82}"/>
     <dgm:cxn modelId="{BBA421CB-39ED-9A42-9257-255536678001}" type="presOf" srcId="{B7669CF0-A41E-1444-851C-485CA7C02540}" destId="{7F6AADFB-2451-E54A-BF72-CB3083280E92}" srcOrd="0" destOrd="0" presId="urn:microsoft.com/office/officeart/2009/layout/CircleArrowProcess"/>
     <dgm:cxn modelId="{BB4796D1-AB16-B146-81B7-D19385836730}" srcId="{EC01D706-F017-FD44-88D8-6905872D61FE}" destId="{B7669CF0-A41E-1444-851C-485CA7C02540}" srcOrd="2" destOrd="0" parTransId="{FF660795-3A5A-6A49-A9E8-DFDE5D70F409}" sibTransId="{C0D21771-88C4-E442-B3B2-6B04B603237A}"/>
-    <dgm:cxn modelId="{51370CED-5017-0642-B044-D87BC8F37D3F}" type="presOf" srcId="{F8AEA3BC-9BCC-4946-B4B7-6FC44289BCCC}" destId="{D6B48E76-4AAC-CD48-8B71-6E8F654914BB}" srcOrd="0" destOrd="0" presId="urn:microsoft.com/office/officeart/2009/layout/CircleArrowProcess"/>
+    <dgm:cxn modelId="{92A58827-15F8-7E4B-AE37-21C40438A6ED}" srcId="{EC01D706-F017-FD44-88D8-6905872D61FE}" destId="{1789D647-2489-4848-9A26-235FB3D1F445}" srcOrd="0" destOrd="0" parTransId="{34DCF5B2-51D9-014D-AA80-13430F13CC75}" sibTransId="{72C663D2-9591-BA4D-A349-8D8BC9DDC2FC}"/>
     <dgm:cxn modelId="{D9DB7BEF-9CDD-0942-86BE-B8EB966D478C}" type="presOf" srcId="{EC01D706-F017-FD44-88D8-6905872D61FE}" destId="{3B8CBF02-C333-1D4B-9642-84564CD7F192}" srcOrd="0" destOrd="0" presId="urn:microsoft.com/office/officeart/2009/layout/CircleArrowProcess"/>
-    <dgm:cxn modelId="{73215FFA-C57A-C543-AA35-4CE9EEE844E7}" type="presOf" srcId="{1789D647-2489-4848-9A26-235FB3D1F445}" destId="{70886D2B-160E-C44F-B061-82C93659D59B}" srcOrd="0" destOrd="0" presId="urn:microsoft.com/office/officeart/2009/layout/CircleArrowProcess"/>
     <dgm:cxn modelId="{112353DD-162D-BF4F-9E69-FA161EE81244}" type="presParOf" srcId="{3B8CBF02-C333-1D4B-9642-84564CD7F192}" destId="{E4CCFA41-F774-A94E-A04B-50D8C7DE50ED}" srcOrd="0" destOrd="0" presId="urn:microsoft.com/office/officeart/2009/layout/CircleArrowProcess"/>
     <dgm:cxn modelId="{7D13368E-9BA7-4D4B-A5D2-070F9719ED54}" type="presParOf" srcId="{E4CCFA41-F774-A94E-A04B-50D8C7DE50ED}" destId="{794855B9-E1C7-EA44-A3C5-969D1C853DE2}" srcOrd="0" destOrd="0" presId="urn:microsoft.com/office/officeart/2009/layout/CircleArrowProcess"/>
     <dgm:cxn modelId="{7FFC9FF4-3945-E94C-B48D-DD6ACCCBD674}" type="presParOf" srcId="{3B8CBF02-C333-1D4B-9642-84564CD7F192}" destId="{70886D2B-160E-C44F-B061-82C93659D59B}" srcOrd="1" destOrd="0" presId="urn:microsoft.com/office/officeart/2009/layout/CircleArrowProcess"/>
@@ -1212,7 +1240,7 @@
         </a:bodyPr>
         <a:lstStyle/>
         <a:p>
-          <a:pPr marL="0" lvl="0" indent="0" algn="ctr" defTabSz="977900">
+          <a:pPr lvl="0" algn="ctr" defTabSz="977900">
             <a:lnSpc>
               <a:spcPct val="90000"/>
             </a:lnSpc>
@@ -1222,7 +1250,6 @@
             <a:spcAft>
               <a:spcPct val="35000"/>
             </a:spcAft>
-            <a:buNone/>
           </a:pPr>
           <a:r>
             <a:rPr lang="en-US" sz="2200" kern="1200" dirty="0"/>
@@ -1230,7 +1257,7 @@
           </a:r>
         </a:p>
         <a:p>
-          <a:pPr marL="0" lvl="0" indent="0" algn="ctr" defTabSz="977900">
+          <a:pPr lvl="0" algn="ctr" defTabSz="977900">
             <a:lnSpc>
               <a:spcPct val="90000"/>
             </a:lnSpc>
@@ -1240,7 +1267,6 @@
             <a:spcAft>
               <a:spcPct val="35000"/>
             </a:spcAft>
-            <a:buNone/>
           </a:pPr>
           <a:r>
             <a:rPr lang="en-US" sz="2200" kern="1200" dirty="0"/>
@@ -1332,7 +1358,7 @@
         </a:bodyPr>
         <a:lstStyle/>
         <a:p>
-          <a:pPr marL="0" lvl="0" indent="0" algn="ctr" defTabSz="977900">
+          <a:pPr lvl="0" algn="ctr" defTabSz="977900">
             <a:lnSpc>
               <a:spcPct val="90000"/>
             </a:lnSpc>
@@ -1342,7 +1368,6 @@
             <a:spcAft>
               <a:spcPct val="35000"/>
             </a:spcAft>
-            <a:buNone/>
           </a:pPr>
           <a:r>
             <a:rPr lang="en-US" sz="2200" kern="1200" dirty="0"/>
@@ -1432,7 +1457,7 @@
         </a:bodyPr>
         <a:lstStyle/>
         <a:p>
-          <a:pPr marL="0" lvl="0" indent="0" algn="ctr" defTabSz="977900">
+          <a:pPr lvl="0" algn="ctr" defTabSz="977900">
             <a:lnSpc>
               <a:spcPct val="90000"/>
             </a:lnSpc>
@@ -1442,7 +1467,6 @@
             <a:spcAft>
               <a:spcPct val="35000"/>
             </a:spcAft>
-            <a:buNone/>
           </a:pPr>
           <a:r>
             <a:rPr lang="en-US" sz="2200" kern="1200" dirty="0"/>
@@ -4678,7 +4702,7 @@
           <a:p>
             <a:fld id="{69CE500B-FF5B-4B28-95C2-E41CE5CE306B}" type="datetimeFigureOut">
               <a:rPr lang="en-US" smtClean="0"/>
-              <a:t>3/20/2017</a:t>
+              <a:t>3/21/17</a:t>
             </a:fld>
             <a:endParaRPr lang="en-US"/>
           </a:p>
@@ -5180,7 +5204,7 @@
           <a:p>
             <a:fld id="{DE94126C-84A0-4B2B-A8D1-685EF76357B6}" type="datetimeFigureOut">
               <a:rPr lang="en-US" smtClean="0"/>
-              <a:t>3/20/2017</a:t>
+              <a:t>3/21/17</a:t>
             </a:fld>
             <a:endParaRPr lang="en-US"/>
           </a:p>
@@ -5350,7 +5374,7 @@
           <a:p>
             <a:fld id="{DE94126C-84A0-4B2B-A8D1-685EF76357B6}" type="datetimeFigureOut">
               <a:rPr lang="en-US" smtClean="0"/>
-              <a:t>3/20/2017</a:t>
+              <a:t>3/21/17</a:t>
             </a:fld>
             <a:endParaRPr lang="en-US"/>
           </a:p>
@@ -5530,7 +5554,7 @@
           <a:p>
             <a:fld id="{DE94126C-84A0-4B2B-A8D1-685EF76357B6}" type="datetimeFigureOut">
               <a:rPr lang="en-US" smtClean="0"/>
-              <a:t>3/20/2017</a:t>
+              <a:t>3/21/17</a:t>
             </a:fld>
             <a:endParaRPr lang="en-US"/>
           </a:p>
@@ -5700,7 +5724,7 @@
           <a:p>
             <a:fld id="{DE94126C-84A0-4B2B-A8D1-685EF76357B6}" type="datetimeFigureOut">
               <a:rPr lang="en-US" smtClean="0"/>
-              <a:t>3/20/2017</a:t>
+              <a:t>3/21/17</a:t>
             </a:fld>
             <a:endParaRPr lang="en-US"/>
           </a:p>
@@ -5944,7 +5968,7 @@
           <a:p>
             <a:fld id="{DE94126C-84A0-4B2B-A8D1-685EF76357B6}" type="datetimeFigureOut">
               <a:rPr lang="en-US" smtClean="0"/>
-              <a:t>3/20/2017</a:t>
+              <a:t>3/21/17</a:t>
             </a:fld>
             <a:endParaRPr lang="en-US"/>
           </a:p>
@@ -6176,7 +6200,7 @@
           <a:p>
             <a:fld id="{DE94126C-84A0-4B2B-A8D1-685EF76357B6}" type="datetimeFigureOut">
               <a:rPr lang="en-US" smtClean="0"/>
-              <a:t>3/20/2017</a:t>
+              <a:t>3/21/17</a:t>
             </a:fld>
             <a:endParaRPr lang="en-US"/>
           </a:p>
@@ -6543,7 +6567,7 @@
           <a:p>
             <a:fld id="{DE94126C-84A0-4B2B-A8D1-685EF76357B6}" type="datetimeFigureOut">
               <a:rPr lang="en-US" smtClean="0"/>
-              <a:t>3/20/2017</a:t>
+              <a:t>3/21/17</a:t>
             </a:fld>
             <a:endParaRPr lang="en-US"/>
           </a:p>
@@ -6661,7 +6685,7 @@
           <a:p>
             <a:fld id="{DE94126C-84A0-4B2B-A8D1-685EF76357B6}" type="datetimeFigureOut">
               <a:rPr lang="en-US" smtClean="0"/>
-              <a:t>3/20/2017</a:t>
+              <a:t>3/21/17</a:t>
             </a:fld>
             <a:endParaRPr lang="en-US"/>
           </a:p>
@@ -6756,7 +6780,7 @@
           <a:p>
             <a:fld id="{DE94126C-84A0-4B2B-A8D1-685EF76357B6}" type="datetimeFigureOut">
               <a:rPr lang="en-US" smtClean="0"/>
-              <a:t>3/20/2017</a:t>
+              <a:t>3/21/17</a:t>
             </a:fld>
             <a:endParaRPr lang="en-US"/>
           </a:p>
@@ -7033,7 +7057,7 @@
           <a:p>
             <a:fld id="{DE94126C-84A0-4B2B-A8D1-685EF76357B6}" type="datetimeFigureOut">
               <a:rPr lang="en-US" smtClean="0"/>
-              <a:t>3/20/2017</a:t>
+              <a:t>3/21/17</a:t>
             </a:fld>
             <a:endParaRPr lang="en-US"/>
           </a:p>
@@ -7290,7 +7314,7 @@
           <a:p>
             <a:fld id="{DE94126C-84A0-4B2B-A8D1-685EF76357B6}" type="datetimeFigureOut">
               <a:rPr lang="en-US" smtClean="0"/>
-              <a:t>3/20/2017</a:t>
+              <a:t>3/21/17</a:t>
             </a:fld>
             <a:endParaRPr lang="en-US"/>
           </a:p>
@@ -7503,7 +7527,7 @@
           <a:p>
             <a:fld id="{DE94126C-84A0-4B2B-A8D1-685EF76357B6}" type="datetimeFigureOut">
               <a:rPr lang="en-US" smtClean="0"/>
-              <a:t>3/20/2017</a:t>
+              <a:t>3/21/17</a:t>
             </a:fld>
             <a:endParaRPr lang="en-US"/>
           </a:p>
@@ -7930,7 +7954,7 @@
         </p:blipFill>
         <p:spPr>
           <a:xfrm>
-            <a:off x="37393841" y="15028665"/>
+            <a:off x="37393841" y="15093979"/>
             <a:ext cx="5486400" cy="4023360"/>
           </a:xfrm>
           <a:prstGeom prst="rect">
@@ -7960,7 +7984,7 @@
         </p:blipFill>
         <p:spPr>
           <a:xfrm>
-            <a:off x="29255929" y="10634891"/>
+            <a:off x="29255929" y="10569577"/>
             <a:ext cx="14401800" cy="4114800"/>
           </a:xfrm>
           <a:prstGeom prst="rect">
@@ -7976,7 +8000,7 @@
         </p:nvSpPr>
         <p:spPr>
           <a:xfrm>
-            <a:off x="190534" y="28835977"/>
+            <a:off x="190534" y="29064576"/>
             <a:ext cx="14235427" cy="3336512"/>
           </a:xfrm>
           <a:prstGeom prst="rect">
@@ -8436,7 +8460,7 @@
         </p:nvSpPr>
         <p:spPr>
           <a:xfrm>
-            <a:off x="357578" y="11182137"/>
+            <a:off x="357578" y="11214794"/>
             <a:ext cx="14112711" cy="3123932"/>
           </a:xfrm>
           <a:prstGeom prst="rect">
@@ -8627,7 +8651,7 @@
         </p:nvSpPr>
         <p:spPr>
           <a:xfrm>
-            <a:off x="408458" y="22204743"/>
+            <a:off x="408458" y="22465999"/>
             <a:ext cx="14183494" cy="6386364"/>
           </a:xfrm>
           <a:prstGeom prst="rect">
@@ -8848,7 +8872,7 @@
         </p:nvSpPr>
         <p:spPr>
           <a:xfrm>
-            <a:off x="70801" y="28807233"/>
+            <a:off x="70801" y="29035832"/>
             <a:ext cx="14084573" cy="1384995"/>
           </a:xfrm>
           <a:prstGeom prst="rect">
@@ -9047,7 +9071,7 @@
         </p:nvSpPr>
         <p:spPr>
           <a:xfrm>
-            <a:off x="29367310" y="30740747"/>
+            <a:off x="29367310" y="30806061"/>
             <a:ext cx="14358560" cy="1815882"/>
           </a:xfrm>
           <a:prstGeom prst="rect">
@@ -9118,7 +9142,7 @@
         </p:nvSpPr>
         <p:spPr>
           <a:xfrm>
-            <a:off x="29292147" y="19966755"/>
+            <a:off x="29292147" y="20130040"/>
             <a:ext cx="14384756" cy="5093702"/>
           </a:xfrm>
           <a:prstGeom prst="rect">
@@ -9399,15 +9423,7 @@
                 <a:ea typeface="Helvetica" charset="0"/>
                 <a:cs typeface="Helvetica" charset="0"/>
               </a:rPr>
-              <a:t>,   	either</a:t>
-            </a:r>
-            <a:r>
-              <a:rPr lang="en-US" sz="3200" dirty="0">
-                <a:latin typeface="Helvetica" charset="0"/>
-                <a:ea typeface="Helvetica" charset="0"/>
-                <a:cs typeface="Helvetica" charset="0"/>
-              </a:rPr>
-              <a:t> interpretation (w=0 or w≠3) accomplishes this goal: answer = no</a:t>
+              <a:t>,   	either interpretation (w=0 or w≠3) accomplishes this goal: answer = no</a:t>
             </a:r>
           </a:p>
         </p:txBody>
@@ -9876,7 +9892,7 @@
         </p:nvSpPr>
         <p:spPr>
           <a:xfrm>
-            <a:off x="29066447" y="14443890"/>
+            <a:off x="29099104" y="14313262"/>
             <a:ext cx="14890610" cy="584775"/>
           </a:xfrm>
           <a:prstGeom prst="rect">
@@ -9958,7 +9974,7 @@
         </p:nvGrpSpPr>
         <p:grpSpPr>
           <a:xfrm>
-            <a:off x="8748838" y="23547281"/>
+            <a:off x="8748838" y="23808537"/>
             <a:ext cx="5173001" cy="4226922"/>
             <a:chOff x="8688135" y="25190019"/>
             <a:chExt cx="5173001" cy="4226922"/>
@@ -10106,7 +10122,7 @@
         </p:nvSpPr>
         <p:spPr>
           <a:xfrm>
-            <a:off x="190534" y="18308227"/>
+            <a:off x="190534" y="18536826"/>
             <a:ext cx="14425438" cy="1708160"/>
           </a:xfrm>
           <a:prstGeom prst="rect">
@@ -10138,7 +10154,7 @@
         </p:nvSpPr>
         <p:spPr>
           <a:xfrm>
-            <a:off x="0" y="14318955"/>
+            <a:off x="0" y="14384269"/>
             <a:ext cx="14660067" cy="738664"/>
           </a:xfrm>
           <a:prstGeom prst="rect">
@@ -10177,8 +10193,8 @@
         </p:nvSpPr>
         <p:spPr>
           <a:xfrm>
-            <a:off x="364590" y="15049693"/>
-            <a:ext cx="14015793" cy="2554545"/>
+            <a:off x="364590" y="15082350"/>
+            <a:ext cx="14015793" cy="2631490"/>
           </a:xfrm>
           <a:prstGeom prst="rect">
             <a:avLst/>
@@ -10274,17 +10290,55 @@
                 <a:latin typeface="Helvetica" panose="020B0604020202020204" pitchFamily="34" charset="0"/>
                 <a:cs typeface="Helvetica" panose="020B0604020202020204" pitchFamily="34" charset="0"/>
               </a:rPr>
-              <a:t>(Viau et al., 2010)</a:t>
-            </a:r>
-          </a:p>
-          <a:p>
-            <a:r>
-              <a:rPr lang="en-US" sz="3200" dirty="0">
+              <a:t>(Viau et al., 2010</a:t>
+            </a:r>
+            <a:r>
+              <a:rPr lang="en-US" sz="3200" dirty="0" smtClean="0">
                 <a:latin typeface="Helvetica" panose="020B0604020202020204" pitchFamily="34" charset="0"/>
                 <a:cs typeface="Helvetica" panose="020B0604020202020204" pitchFamily="34" charset="0"/>
               </a:rPr>
-              <a:t>Consensus: Context management (check), grammatical processing (?)</a:t>
-            </a:r>
+              <a:t>)</a:t>
+            </a:r>
+          </a:p>
+          <a:p>
+            <a:endParaRPr lang="en-US" sz="500" dirty="0">
+              <a:latin typeface="Helvetica" panose="020B0604020202020204" pitchFamily="34" charset="0"/>
+              <a:cs typeface="Helvetica" panose="020B0604020202020204" pitchFamily="34" charset="0"/>
+            </a:endParaRPr>
+          </a:p>
+          <a:p>
+            <a:r>
+              <a:rPr lang="en-US" sz="3200" dirty="0">
+                <a:latin typeface="Helvetica" panose="020B0604020202020204" pitchFamily="34" charset="0"/>
+                <a:cs typeface="Helvetica" panose="020B0604020202020204" pitchFamily="34" charset="0"/>
+              </a:rPr>
+              <a:t>Consensus: Context management </a:t>
+            </a:r>
+            <a:r>
+              <a:rPr lang="en-US" sz="3200" dirty="0" smtClean="0">
+                <a:latin typeface="Helvetica" panose="020B0604020202020204" pitchFamily="34" charset="0"/>
+                <a:cs typeface="Helvetica" panose="020B0604020202020204" pitchFamily="34" charset="0"/>
+              </a:rPr>
+              <a:t>       </a:t>
+            </a:r>
+            <a:r>
+              <a:rPr lang="en-US" sz="3200" dirty="0">
+                <a:latin typeface="Helvetica" panose="020B0604020202020204" pitchFamily="34" charset="0"/>
+                <a:cs typeface="Helvetica" panose="020B0604020202020204" pitchFamily="34" charset="0"/>
+              </a:rPr>
+              <a:t>G</a:t>
+            </a:r>
+            <a:r>
+              <a:rPr lang="en-US" sz="3200" dirty="0" smtClean="0">
+                <a:latin typeface="Helvetica" panose="020B0604020202020204" pitchFamily="34" charset="0"/>
+                <a:cs typeface="Helvetica" panose="020B0604020202020204" pitchFamily="34" charset="0"/>
+              </a:rPr>
+              <a:t>rammatical processing</a:t>
+            </a:r>
+            <a:endParaRPr lang="en-US" sz="3200" dirty="0">
+              <a:latin typeface="Helvetica" panose="020B0604020202020204" pitchFamily="34" charset="0"/>
+              <a:cs typeface="Helvetica" panose="020B0604020202020204" pitchFamily="34" charset="0"/>
+            </a:endParaRPr>
           </a:p>
         </p:txBody>
       </p:sp>
@@ -10296,7 +10350,7 @@
         </p:nvSpPr>
         <p:spPr>
           <a:xfrm>
-            <a:off x="781009" y="17569562"/>
+            <a:off x="781009" y="17798161"/>
             <a:ext cx="12664156" cy="738664"/>
           </a:xfrm>
           <a:prstGeom prst="rect">
@@ -10335,7 +10389,7 @@
         </p:nvGrpSpPr>
         <p:grpSpPr>
           <a:xfrm>
-            <a:off x="3938877" y="20123914"/>
+            <a:off x="3938877" y="20385170"/>
             <a:ext cx="6844332" cy="1134036"/>
             <a:chOff x="3649401" y="20790402"/>
             <a:chExt cx="6844332" cy="1134036"/>
@@ -10440,7 +10494,7 @@
         </p:nvSpPr>
         <p:spPr>
           <a:xfrm>
-            <a:off x="1247330" y="21431235"/>
+            <a:off x="1279987" y="21692491"/>
             <a:ext cx="11961069" cy="738664"/>
           </a:xfrm>
           <a:prstGeom prst="rect">
@@ -10479,7 +10533,7 @@
         </p:nvSpPr>
         <p:spPr>
           <a:xfrm>
-            <a:off x="309389" y="30233496"/>
+            <a:off x="309389" y="30462095"/>
             <a:ext cx="14044555" cy="1938992"/>
           </a:xfrm>
           <a:prstGeom prst="rect">
@@ -11297,7 +11351,7 @@
         </p:nvGrpSpPr>
         <p:grpSpPr>
           <a:xfrm>
-            <a:off x="29901681" y="18617268"/>
+            <a:off x="29901681" y="18845867"/>
             <a:ext cx="6844332" cy="1118083"/>
             <a:chOff x="4028879" y="6562112"/>
             <a:chExt cx="6844332" cy="1118083"/>
@@ -11402,8 +11456,8 @@
         </p:nvSpPr>
         <p:spPr>
           <a:xfrm>
-            <a:off x="29382860" y="14966307"/>
-            <a:ext cx="7969370" cy="3616375"/>
+            <a:off x="29382860" y="14998964"/>
+            <a:ext cx="7969370" cy="3770263"/>
           </a:xfrm>
           <a:prstGeom prst="rect">
             <a:avLst/>
@@ -11417,12 +11471,20 @@
           <a:lstStyle/>
           <a:p>
             <a:r>
-              <a:rPr lang="en-US" sz="3200" dirty="0">
-                <a:latin typeface="Helvetica" charset="0"/>
-                <a:ea typeface="Helvetica" charset="0"/>
-                <a:cs typeface="Helvetica" charset="0"/>
-              </a:rPr>
-              <a:t>-We find a stronger role for the </a:t>
+              <a:rPr lang="en-US" sz="3200" dirty="0" smtClean="0">
+                <a:latin typeface="Helvetica" charset="0"/>
+                <a:ea typeface="Helvetica" charset="0"/>
+                <a:cs typeface="Helvetica" charset="0"/>
+              </a:rPr>
+              <a:t>We </a:t>
+            </a:r>
+            <a:r>
+              <a:rPr lang="en-US" sz="3200" dirty="0">
+                <a:latin typeface="Helvetica" charset="0"/>
+                <a:ea typeface="Helvetica" charset="0"/>
+                <a:cs typeface="Helvetica" charset="0"/>
+              </a:rPr>
+              <a:t>find a stronger role for the </a:t>
             </a:r>
             <a:r>
               <a:rPr lang="en-US" sz="3200" dirty="0">
@@ -11450,6 +11512,77 @@
             </a:endParaRPr>
           </a:p>
           <a:p>
+            <a:endParaRPr lang="en-US" sz="800" dirty="0">
+              <a:latin typeface="Helvetica" charset="0"/>
+              <a:ea typeface="Helvetica" charset="0"/>
+              <a:cs typeface="Helvetica" charset="0"/>
+            </a:endParaRPr>
+          </a:p>
+          <a:p>
+            <a:r>
+              <a:rPr lang="en-US" sz="3200" dirty="0" smtClean="0">
+                <a:latin typeface="Helvetica" charset="0"/>
+                <a:ea typeface="Helvetica" charset="0"/>
+                <a:cs typeface="Helvetica" charset="0"/>
+              </a:rPr>
+              <a:t>We </a:t>
+            </a:r>
+            <a:r>
+              <a:rPr lang="en-US" sz="3200" dirty="0">
+                <a:latin typeface="Helvetica" charset="0"/>
+                <a:ea typeface="Helvetica" charset="0"/>
+                <a:cs typeface="Helvetica" charset="0"/>
+              </a:rPr>
+              <a:t>see this result more clearly in Fig. 3 where </a:t>
+            </a:r>
+            <a:r>
+              <a:rPr lang="en-US" sz="3200" dirty="0">
+                <a:solidFill>
+                  <a:srgbClr val="7030A0"/>
+                </a:solidFill>
+                <a:latin typeface="Helvetica" charset="0"/>
+                <a:ea typeface="Helvetica" charset="0"/>
+                <a:cs typeface="Helvetica" charset="0"/>
+              </a:rPr>
+              <a:t>pragmatic factors </a:t>
+            </a:r>
+            <a:r>
+              <a:rPr lang="en-US" sz="3200" dirty="0">
+                <a:latin typeface="Helvetica" charset="0"/>
+                <a:ea typeface="Helvetica" charset="0"/>
+                <a:cs typeface="Helvetica" charset="0"/>
+              </a:rPr>
+              <a:t>overwhelm the </a:t>
+            </a:r>
+            <a:r>
+              <a:rPr lang="en-US" sz="3200" dirty="0">
+                <a:solidFill>
+                  <a:srgbClr val="FF7A00"/>
+                </a:solidFill>
+                <a:latin typeface="Helvetica" charset="0"/>
+                <a:ea typeface="Helvetica" charset="0"/>
+                <a:cs typeface="Helvetica" charset="0"/>
+              </a:rPr>
+              <a:t>scope</a:t>
+            </a:r>
+            <a:r>
+              <a:rPr lang="en-US" sz="3200" dirty="0">
+                <a:latin typeface="Helvetica" charset="0"/>
+                <a:ea typeface="Helvetica" charset="0"/>
+                <a:cs typeface="Helvetica" charset="0"/>
+              </a:rPr>
+              <a:t> prior </a:t>
+            </a:r>
+            <a:r>
+              <a:rPr lang="en-US" sz="3200" dirty="0" smtClean="0">
+                <a:latin typeface="Helvetica" charset="0"/>
+                <a:ea typeface="Helvetica" charset="0"/>
+                <a:cs typeface="Helvetica" charset="0"/>
+              </a:rPr>
+              <a:t>manipulation</a:t>
+            </a:r>
+          </a:p>
+          <a:p>
             <a:endParaRPr lang="en-US" sz="500" dirty="0">
               <a:latin typeface="Helvetica" charset="0"/>
               <a:ea typeface="Helvetica" charset="0"/>
@@ -11458,59 +11591,11 @@
           </a:p>
           <a:p>
             <a:r>
-              <a:rPr lang="en-US" sz="3200" dirty="0">
-                <a:latin typeface="Helvetica" charset="0"/>
-                <a:ea typeface="Helvetica" charset="0"/>
-                <a:cs typeface="Helvetica" charset="0"/>
-              </a:rPr>
-              <a:t>-We see this result more clearly in Fig. 3 where </a:t>
-            </a:r>
-            <a:r>
-              <a:rPr lang="en-US" sz="3200" dirty="0">
-                <a:solidFill>
-                  <a:srgbClr val="7030A0"/>
-                </a:solidFill>
-                <a:latin typeface="Helvetica" charset="0"/>
-                <a:ea typeface="Helvetica" charset="0"/>
-                <a:cs typeface="Helvetica" charset="0"/>
-              </a:rPr>
-              <a:t>pragmatic factors </a:t>
-            </a:r>
-            <a:r>
-              <a:rPr lang="en-US" sz="3200" dirty="0">
-                <a:latin typeface="Helvetica" charset="0"/>
-                <a:ea typeface="Helvetica" charset="0"/>
-                <a:cs typeface="Helvetica" charset="0"/>
-              </a:rPr>
-              <a:t>overwhelm the </a:t>
-            </a:r>
-            <a:r>
-              <a:rPr lang="en-US" sz="3200" dirty="0">
-                <a:solidFill>
-                  <a:srgbClr val="FF7A00"/>
-                </a:solidFill>
-                <a:latin typeface="Helvetica" charset="0"/>
-                <a:ea typeface="Helvetica" charset="0"/>
-                <a:cs typeface="Helvetica" charset="0"/>
-              </a:rPr>
-              <a:t>scope</a:t>
-            </a:r>
-            <a:r>
-              <a:rPr lang="en-US" sz="3200" dirty="0">
-                <a:latin typeface="Helvetica" charset="0"/>
-                <a:ea typeface="Helvetica" charset="0"/>
-                <a:cs typeface="Helvetica" charset="0"/>
-              </a:rPr>
-              <a:t> prior manipulation</a:t>
-            </a:r>
-          </a:p>
-          <a:p>
-            <a:r>
-              <a:rPr lang="en-US" sz="3200" dirty="0">
+              <a:rPr lang="en-US" sz="3200" dirty="0" smtClean="0">
                 <a:latin typeface="Helvetica" panose="020B0604020202020204" pitchFamily="34" charset="0"/>
                 <a:cs typeface="Helvetica" panose="020B0604020202020204" pitchFamily="34" charset="0"/>
               </a:rPr>
-              <a:t>-</a:t>
+              <a:t> -</a:t>
             </a:r>
             <a:r>
               <a:rPr lang="en-US" sz="3200" dirty="0">
@@ -11529,11 +11614,11 @@
           </a:p>
           <a:p>
             <a:r>
-              <a:rPr lang="en-US" sz="3200" dirty="0">
+              <a:rPr lang="en-US" sz="3200" dirty="0" smtClean="0">
                 <a:latin typeface="Helvetica" panose="020B0604020202020204" pitchFamily="34" charset="0"/>
                 <a:cs typeface="Helvetica" panose="020B0604020202020204" pitchFamily="34" charset="0"/>
               </a:rPr>
-              <a:t>-</a:t>
+              <a:t> -</a:t>
             </a:r>
             <a:r>
               <a:rPr lang="en-US" sz="3200" dirty="0">
@@ -11880,7 +11965,7 @@
         </p:nvSpPr>
         <p:spPr>
           <a:xfrm>
-            <a:off x="29230659" y="25028593"/>
+            <a:off x="29230659" y="25224535"/>
             <a:ext cx="14642174" cy="738664"/>
           </a:xfrm>
           <a:prstGeom prst="rect">
@@ -11919,7 +12004,7 @@
         </p:nvSpPr>
         <p:spPr>
           <a:xfrm>
-            <a:off x="29230658" y="28205950"/>
+            <a:off x="29230658" y="28401892"/>
             <a:ext cx="14642175" cy="738664"/>
           </a:xfrm>
           <a:prstGeom prst="rect">
@@ -11958,7 +12043,7 @@
         </p:nvSpPr>
         <p:spPr>
           <a:xfrm>
-            <a:off x="29339369" y="25709331"/>
+            <a:off x="29339369" y="25905273"/>
             <a:ext cx="14533464" cy="2554545"/>
           </a:xfrm>
           <a:prstGeom prst="rect">
@@ -12011,7 +12096,7 @@
         </p:nvSpPr>
         <p:spPr>
           <a:xfrm>
-            <a:off x="29297004" y="28923233"/>
+            <a:off x="29297004" y="29053861"/>
             <a:ext cx="14429496" cy="1569660"/>
           </a:xfrm>
           <a:prstGeom prst="rect">
@@ -12481,7 +12566,7 @@
         </p:nvSpPr>
         <p:spPr>
           <a:xfrm>
-            <a:off x="36979237" y="18642034"/>
+            <a:off x="36979237" y="18707348"/>
             <a:ext cx="6484340" cy="1077218"/>
           </a:xfrm>
           <a:prstGeom prst="rect">
@@ -12802,7 +12887,7 @@
         </p:blipFill>
         <p:spPr>
           <a:xfrm>
-            <a:off x="33583544" y="17569562"/>
+            <a:off x="33779486" y="17667533"/>
             <a:ext cx="441831" cy="441831"/>
           </a:xfrm>
           <a:prstGeom prst="rect">
@@ -12832,7 +12917,67 @@
         </p:blipFill>
         <p:spPr>
           <a:xfrm>
-            <a:off x="34025375" y="18057659"/>
+            <a:off x="34221317" y="18155630"/>
+            <a:ext cx="448993" cy="448993"/>
+          </a:xfrm>
+          <a:prstGeom prst="rect">
+            <a:avLst/>
+          </a:prstGeom>
+        </p:spPr>
+      </p:pic>
+      <p:pic>
+        <p:nvPicPr>
+          <p:cNvPr id="109" name="Picture 108"/>
+          <p:cNvPicPr>
+            <a:picLocks noChangeAspect="1"/>
+          </p:cNvPicPr>
+          <p:nvPr/>
+        </p:nvPicPr>
+        <p:blipFill>
+          <a:blip r:embed="rId20">
+            <a:extLst>
+              <a:ext uri="{28A0092B-C50C-407E-A947-70E740481C1C}">
+                <a14:useLocalDpi xmlns:a14="http://schemas.microsoft.com/office/drawing/2010/main" val="0"/>
+              </a:ext>
+            </a:extLst>
+          </a:blip>
+          <a:stretch>
+            <a:fillRect/>
+          </a:stretch>
+        </p:blipFill>
+        <p:spPr>
+          <a:xfrm>
+            <a:off x="6695898" y="17185823"/>
+            <a:ext cx="441831" cy="441831"/>
+          </a:xfrm>
+          <a:prstGeom prst="rect">
+            <a:avLst/>
+          </a:prstGeom>
+        </p:spPr>
+      </p:pic>
+      <p:pic>
+        <p:nvPicPr>
+          <p:cNvPr id="110" name="Picture 109"/>
+          <p:cNvPicPr>
+            <a:picLocks noChangeAspect="1"/>
+          </p:cNvPicPr>
+          <p:nvPr/>
+        </p:nvPicPr>
+        <p:blipFill>
+          <a:blip r:embed="rId21">
+            <a:extLst>
+              <a:ext uri="{28A0092B-C50C-407E-A947-70E740481C1C}">
+                <a14:useLocalDpi xmlns:a14="http://schemas.microsoft.com/office/drawing/2010/main" val="0"/>
+              </a:ext>
+            </a:extLst>
+          </a:blip>
+          <a:stretch>
+            <a:fillRect/>
+          </a:stretch>
+        </p:blipFill>
+        <p:spPr>
+          <a:xfrm>
+            <a:off x="11970970" y="17182242"/>
             <a:ext cx="448993" cy="448993"/>
           </a:xfrm>
           <a:prstGeom prst="rect">

</xml_diff>